<commit_message>
parei na questao 5
</commit_message>
<xml_diff>
--- a/GA/Trabalho1/prints.pptx
+++ b/GA/Trabalho1/prints.pptx
@@ -6,6 +6,12 @@
   </p:sldMasterIdLst>
   <p:sldIdLst>
     <p:sldId id="256" r:id="rId2"/>
+    <p:sldId id="257" r:id="rId3"/>
+    <p:sldId id="258" r:id="rId4"/>
+    <p:sldId id="259" r:id="rId5"/>
+    <p:sldId id="260" r:id="rId6"/>
+    <p:sldId id="261" r:id="rId7"/>
+    <p:sldId id="262" r:id="rId8"/>
   </p:sldIdLst>
   <p:sldSz cx="12192000" cy="6858000"/>
   <p:notesSz cx="6858000" cy="9144000"/>
@@ -104,7 +110,32 @@
       </a:defRPr>
     </a:lvl9pPr>
   </p:defaultTextStyle>
+  <p:extLst>
+    <p:ext uri="{EFAFB233-063F-42B5-8137-9DF3F51BA10A}">
+      <p15:sldGuideLst xmlns:p15="http://schemas.microsoft.com/office/powerpoint/2012/main"/>
+    </p:ext>
+  </p:extLst>
 </p:presentation>
+</file>
+
+<file path=ppt/commentAuthors.xml><?xml version="1.0" encoding="utf-8"?>
+<p:cmAuthorLst xmlns:a="http://schemas.openxmlformats.org/drawingml/2006/main" xmlns:r="http://schemas.openxmlformats.org/officeDocument/2006/relationships" xmlns:p="http://schemas.openxmlformats.org/presentationml/2006/main">
+  <p:cmAuthor id="1" name="Matheus Nogueira" initials="MN" lastIdx="12" clrIdx="0">
+    <p:extLst>
+      <p:ext uri="{19B8F6BF-5375-455C-9EA6-DF929625EA0E}">
+        <p15:presenceInfo xmlns:p15="http://schemas.microsoft.com/office/powerpoint/2012/main" userId="3ffbdc37af4c2ab0" providerId="Windows Live"/>
+      </p:ext>
+    </p:extLst>
+  </p:cmAuthor>
+</p:cmAuthorLst>
+</file>
+
+<file path=ppt/revisionInfo.xml><?xml version="1.0" encoding="utf-8"?>
+<p1510:revInfo xmlns:a="http://schemas.openxmlformats.org/drawingml/2006/main" xmlns:r="http://schemas.openxmlformats.org/officeDocument/2006/relationships" xmlns:p1510="http://schemas.microsoft.com/office/powerpoint/2015/10/main">
+  <p1510:revLst>
+    <p1510:client id="{4C4D23FA-B87B-4348-80D3-932FF489E74F}" v="19" dt="2021-05-08T00:10:16.009"/>
+  </p1510:revLst>
+</p1510:revInfo>
 </file>
 
 <file path=ppt/changesInfos/changesInfo1.xml><?xml version="1.0" encoding="utf-8"?>
@@ -112,12 +143,12 @@
   <pc:docChgLst>
     <pc:chgData name="Matheus Nogueira" userId="3ffbdc37af4c2ab0" providerId="LiveId" clId="{4C4D23FA-B87B-4348-80D3-932FF489E74F}"/>
     <pc:docChg chg="custSel addSld modSld">
-      <pc:chgData name="Matheus Nogueira" userId="3ffbdc37af4c2ab0" providerId="LiveId" clId="{4C4D23FA-B87B-4348-80D3-932FF489E74F}" dt="2021-05-07T19:29:36.476" v="3" actId="1076"/>
+      <pc:chgData name="Matheus Nogueira" userId="3ffbdc37af4c2ab0" providerId="LiveId" clId="{4C4D23FA-B87B-4348-80D3-932FF489E74F}" dt="2021-05-08T00:10:20.612" v="333" actId="680"/>
       <pc:docMkLst>
         <pc:docMk/>
       </pc:docMkLst>
-      <pc:sldChg chg="addSp delSp modSp new mod">
-        <pc:chgData name="Matheus Nogueira" userId="3ffbdc37af4c2ab0" providerId="LiveId" clId="{4C4D23FA-B87B-4348-80D3-932FF489E74F}" dt="2021-05-07T19:29:36.476" v="3" actId="1076"/>
+      <pc:sldChg chg="addSp delSp modSp new mod addCm modCm">
+        <pc:chgData name="Matheus Nogueira" userId="3ffbdc37af4c2ab0" providerId="LiveId" clId="{4C4D23FA-B87B-4348-80D3-932FF489E74F}" dt="2021-05-07T22:31:04.216" v="31"/>
         <pc:sldMkLst>
           <pc:docMk/>
           <pc:sldMk cId="412350758" sldId="256"/>
@@ -130,6 +161,14 @@
             <ac:spMk id="2" creationId="{1D07DA86-3BE1-449D-B224-B98EC047B215}"/>
           </ac:spMkLst>
         </pc:spChg>
+        <pc:spChg chg="add mod">
+          <ac:chgData name="Matheus Nogueira" userId="3ffbdc37af4c2ab0" providerId="LiveId" clId="{4C4D23FA-B87B-4348-80D3-932FF489E74F}" dt="2021-05-07T22:03:49.849" v="16" actId="1076"/>
+          <ac:spMkLst>
+            <pc:docMk/>
+            <pc:sldMk cId="412350758" sldId="256"/>
+            <ac:spMk id="2" creationId="{6BED7C09-A787-4222-8E85-A9B1F53AC54E}"/>
+          </ac:spMkLst>
+        </pc:spChg>
         <pc:spChg chg="del">
           <ac:chgData name="Matheus Nogueira" userId="3ffbdc37af4c2ab0" providerId="LiveId" clId="{4C4D23FA-B87B-4348-80D3-932FF489E74F}" dt="2021-05-07T19:29:21.118" v="1" actId="478"/>
           <ac:spMkLst>
@@ -139,17 +178,370 @@
           </ac:spMkLst>
         </pc:spChg>
         <pc:picChg chg="add mod">
-          <ac:chgData name="Matheus Nogueira" userId="3ffbdc37af4c2ab0" providerId="LiveId" clId="{4C4D23FA-B87B-4348-80D3-932FF489E74F}" dt="2021-05-07T19:29:36.476" v="3" actId="1076"/>
+          <ac:chgData name="Matheus Nogueira" userId="3ffbdc37af4c2ab0" providerId="LiveId" clId="{4C4D23FA-B87B-4348-80D3-932FF489E74F}" dt="2021-05-07T22:23:07.245" v="21" actId="1076"/>
+          <ac:picMkLst>
+            <pc:docMk/>
+            <pc:sldMk cId="412350758" sldId="256"/>
+            <ac:picMk id="4" creationId="{80867CCE-5977-448D-990F-ACC0C7ED3800}"/>
+          </ac:picMkLst>
+        </pc:picChg>
+        <pc:picChg chg="add mod">
+          <ac:chgData name="Matheus Nogueira" userId="3ffbdc37af4c2ab0" providerId="LiveId" clId="{4C4D23FA-B87B-4348-80D3-932FF489E74F}" dt="2021-05-07T22:03:51.174" v="17" actId="1076"/>
           <ac:picMkLst>
             <pc:docMk/>
             <pc:sldMk cId="412350758" sldId="256"/>
             <ac:picMk id="5" creationId="{F7D5B840-5EF6-4B4A-B50D-5D5850AADC55}"/>
           </ac:picMkLst>
         </pc:picChg>
+        <pc:picChg chg="add mod">
+          <ac:chgData name="Matheus Nogueira" userId="3ffbdc37af4c2ab0" providerId="LiveId" clId="{4C4D23FA-B87B-4348-80D3-932FF489E74F}" dt="2021-05-07T22:29:29.354" v="29" actId="1076"/>
+          <ac:picMkLst>
+            <pc:docMk/>
+            <pc:sldMk cId="412350758" sldId="256"/>
+            <ac:picMk id="7" creationId="{5FFD35E8-730B-4EFF-8CF5-2CDB86AAB757}"/>
+          </ac:picMkLst>
+        </pc:picChg>
+      </pc:sldChg>
+      <pc:sldChg chg="addSp delSp modSp new mod addCm modCm">
+        <pc:chgData name="Matheus Nogueira" userId="3ffbdc37af4c2ab0" providerId="LiveId" clId="{4C4D23FA-B87B-4348-80D3-932FF489E74F}" dt="2021-05-07T22:36:05.983" v="57"/>
+        <pc:sldMkLst>
+          <pc:docMk/>
+          <pc:sldMk cId="2679752602" sldId="257"/>
+        </pc:sldMkLst>
+        <pc:spChg chg="del">
+          <ac:chgData name="Matheus Nogueira" userId="3ffbdc37af4c2ab0" providerId="LiveId" clId="{4C4D23FA-B87B-4348-80D3-932FF489E74F}" dt="2021-05-07T22:32:17.498" v="33" actId="478"/>
+          <ac:spMkLst>
+            <pc:docMk/>
+            <pc:sldMk cId="2679752602" sldId="257"/>
+            <ac:spMk id="2" creationId="{277BDAB7-B93F-4F0A-BC9B-0DB61619883B}"/>
+          </ac:spMkLst>
+        </pc:spChg>
+        <pc:spChg chg="del">
+          <ac:chgData name="Matheus Nogueira" userId="3ffbdc37af4c2ab0" providerId="LiveId" clId="{4C4D23FA-B87B-4348-80D3-932FF489E74F}" dt="2021-05-07T22:32:17.498" v="33" actId="478"/>
+          <ac:spMkLst>
+            <pc:docMk/>
+            <pc:sldMk cId="2679752602" sldId="257"/>
+            <ac:spMk id="3" creationId="{11B0F82D-CB8C-4C49-950D-DEE6367FC0E3}"/>
+          </ac:spMkLst>
+        </pc:spChg>
+        <pc:spChg chg="add mod">
+          <ac:chgData name="Matheus Nogueira" userId="3ffbdc37af4c2ab0" providerId="LiveId" clId="{4C4D23FA-B87B-4348-80D3-932FF489E74F}" dt="2021-05-07T22:32:32.096" v="46" actId="1076"/>
+          <ac:spMkLst>
+            <pc:docMk/>
+            <pc:sldMk cId="2679752602" sldId="257"/>
+            <ac:spMk id="4" creationId="{8AB1220E-D807-447E-9899-C40AF2E33761}"/>
+          </ac:spMkLst>
+        </pc:spChg>
+        <pc:picChg chg="add mod">
+          <ac:chgData name="Matheus Nogueira" userId="3ffbdc37af4c2ab0" providerId="LiveId" clId="{4C4D23FA-B87B-4348-80D3-932FF489E74F}" dt="2021-05-07T22:34:13.672" v="50" actId="1076"/>
+          <ac:picMkLst>
+            <pc:docMk/>
+            <pc:sldMk cId="2679752602" sldId="257"/>
+            <ac:picMk id="6" creationId="{73319262-EF31-4977-B153-44422F4258F2}"/>
+          </ac:picMkLst>
+        </pc:picChg>
+        <pc:picChg chg="add mod">
+          <ac:chgData name="Matheus Nogueira" userId="3ffbdc37af4c2ab0" providerId="LiveId" clId="{4C4D23FA-B87B-4348-80D3-932FF489E74F}" dt="2021-05-07T22:35:46.755" v="55" actId="1076"/>
+          <ac:picMkLst>
+            <pc:docMk/>
+            <pc:sldMk cId="2679752602" sldId="257"/>
+            <ac:picMk id="8" creationId="{903C9CE5-ECEF-49E8-980A-0719B87B2023}"/>
+          </ac:picMkLst>
+        </pc:picChg>
+      </pc:sldChg>
+      <pc:sldChg chg="addSp modSp new mod addCm modCm">
+        <pc:chgData name="Matheus Nogueira" userId="3ffbdc37af4c2ab0" providerId="LiveId" clId="{4C4D23FA-B87B-4348-80D3-932FF489E74F}" dt="2021-05-07T22:38:03.823" v="64" actId="1589"/>
+        <pc:sldMkLst>
+          <pc:docMk/>
+          <pc:sldMk cId="923749177" sldId="258"/>
+        </pc:sldMkLst>
+        <pc:picChg chg="add mod">
+          <ac:chgData name="Matheus Nogueira" userId="3ffbdc37af4c2ab0" providerId="LiveId" clId="{4C4D23FA-B87B-4348-80D3-932FF489E74F}" dt="2021-05-07T22:37:27.118" v="61" actId="1076"/>
+          <ac:picMkLst>
+            <pc:docMk/>
+            <pc:sldMk cId="923749177" sldId="258"/>
+            <ac:picMk id="3" creationId="{EB158BA6-BF11-4478-AD55-25C163C74168}"/>
+          </ac:picMkLst>
+        </pc:picChg>
+      </pc:sldChg>
+      <pc:sldChg chg="addSp delSp modSp new mod addCm modCm">
+        <pc:chgData name="Matheus Nogueira" userId="3ffbdc37af4c2ab0" providerId="LiveId" clId="{4C4D23FA-B87B-4348-80D3-932FF489E74F}" dt="2021-05-07T22:50:23.811" v="318" actId="22"/>
+        <pc:sldMkLst>
+          <pc:docMk/>
+          <pc:sldMk cId="2366513634" sldId="259"/>
+        </pc:sldMkLst>
+        <pc:spChg chg="add mod">
+          <ac:chgData name="Matheus Nogueira" userId="3ffbdc37af4c2ab0" providerId="LiveId" clId="{4C4D23FA-B87B-4348-80D3-932FF489E74F}" dt="2021-05-07T22:39:36.064" v="75" actId="20577"/>
+          <ac:spMkLst>
+            <pc:docMk/>
+            <pc:sldMk cId="2366513634" sldId="259"/>
+            <ac:spMk id="2" creationId="{D9FCDD0F-EC9D-43A5-9253-2C00A987DD2F}"/>
+          </ac:spMkLst>
+        </pc:spChg>
+        <pc:picChg chg="add del">
+          <ac:chgData name="Matheus Nogueira" userId="3ffbdc37af4c2ab0" providerId="LiveId" clId="{4C4D23FA-B87B-4348-80D3-932FF489E74F}" dt="2021-05-07T22:41:27.706" v="81" actId="478"/>
+          <ac:picMkLst>
+            <pc:docMk/>
+            <pc:sldMk cId="2366513634" sldId="259"/>
+            <ac:picMk id="4" creationId="{67D52666-56BC-46E4-9B64-A570002FF5F6}"/>
+          </ac:picMkLst>
+        </pc:picChg>
+        <pc:picChg chg="add del">
+          <ac:chgData name="Matheus Nogueira" userId="3ffbdc37af4c2ab0" providerId="LiveId" clId="{4C4D23FA-B87B-4348-80D3-932FF489E74F}" dt="2021-05-07T22:49:32.385" v="316" actId="478"/>
+          <ac:picMkLst>
+            <pc:docMk/>
+            <pc:sldMk cId="2366513634" sldId="259"/>
+            <ac:picMk id="6" creationId="{33E4F6F9-94BD-4BA8-9CF4-E80053333852}"/>
+          </ac:picMkLst>
+        </pc:picChg>
+        <pc:picChg chg="add">
+          <ac:chgData name="Matheus Nogueira" userId="3ffbdc37af4c2ab0" providerId="LiveId" clId="{4C4D23FA-B87B-4348-80D3-932FF489E74F}" dt="2021-05-07T22:50:23.811" v="318" actId="22"/>
+          <ac:picMkLst>
+            <pc:docMk/>
+            <pc:sldMk cId="2366513634" sldId="259"/>
+            <ac:picMk id="8" creationId="{B0C8D825-8682-49F0-8250-64DA7F354AB0}"/>
+          </ac:picMkLst>
+        </pc:picChg>
+      </pc:sldChg>
+      <pc:sldChg chg="addSp delSp modSp new mod addCm modCm">
+        <pc:chgData name="Matheus Nogueira" userId="3ffbdc37af4c2ab0" providerId="LiveId" clId="{4C4D23FA-B87B-4348-80D3-932FF489E74F}" dt="2021-05-07T22:52:54.803" v="322" actId="1076"/>
+        <pc:sldMkLst>
+          <pc:docMk/>
+          <pc:sldMk cId="2421346254" sldId="260"/>
+        </pc:sldMkLst>
+        <pc:spChg chg="add mod">
+          <ac:chgData name="Matheus Nogueira" userId="3ffbdc37af4c2ab0" providerId="LiveId" clId="{4C4D23FA-B87B-4348-80D3-932FF489E74F}" dt="2021-05-07T22:45:24.113" v="289" actId="20577"/>
+          <ac:spMkLst>
+            <pc:docMk/>
+            <pc:sldMk cId="2421346254" sldId="260"/>
+            <ac:spMk id="2" creationId="{18CDB68C-2DF4-4C3F-A62F-2DBEDE31EED2}"/>
+          </ac:spMkLst>
+        </pc:spChg>
+        <pc:picChg chg="add del mod">
+          <ac:chgData name="Matheus Nogueira" userId="3ffbdc37af4c2ab0" providerId="LiveId" clId="{4C4D23FA-B87B-4348-80D3-932FF489E74F}" dt="2021-05-07T22:49:34.441" v="317" actId="478"/>
+          <ac:picMkLst>
+            <pc:docMk/>
+            <pc:sldMk cId="2421346254" sldId="260"/>
+            <ac:picMk id="4" creationId="{E25A3A7A-0E7E-4930-BC93-9E3005FBA280}"/>
+          </ac:picMkLst>
+        </pc:picChg>
+        <pc:picChg chg="add mod">
+          <ac:chgData name="Matheus Nogueira" userId="3ffbdc37af4c2ab0" providerId="LiveId" clId="{4C4D23FA-B87B-4348-80D3-932FF489E74F}" dt="2021-05-07T22:52:54.803" v="322" actId="1076"/>
+          <ac:picMkLst>
+            <pc:docMk/>
+            <pc:sldMk cId="2421346254" sldId="260"/>
+            <ac:picMk id="6" creationId="{DBB40983-2413-49A2-AF90-7E5ECDF728BD}"/>
+          </ac:picMkLst>
+        </pc:picChg>
+      </pc:sldChg>
+      <pc:sldChg chg="addSp modSp new mod addCm modCm">
+        <pc:chgData name="Matheus Nogueira" userId="3ffbdc37af4c2ab0" providerId="LiveId" clId="{4C4D23FA-B87B-4348-80D3-932FF489E74F}" dt="2021-05-08T00:10:16.008" v="332"/>
+        <pc:sldMkLst>
+          <pc:docMk/>
+          <pc:sldMk cId="2641534292" sldId="261"/>
+        </pc:sldMkLst>
+        <pc:spChg chg="add mod">
+          <ac:chgData name="Matheus Nogueira" userId="3ffbdc37af4c2ab0" providerId="LiveId" clId="{4C4D23FA-B87B-4348-80D3-932FF489E74F}" dt="2021-05-07T22:48:39.855" v="299" actId="20577"/>
+          <ac:spMkLst>
+            <pc:docMk/>
+            <pc:sldMk cId="2641534292" sldId="261"/>
+            <ac:spMk id="2" creationId="{935A26CB-FC70-4CF5-927E-C35CCD9FDE74}"/>
+          </ac:spMkLst>
+        </pc:spChg>
+        <pc:spChg chg="add mod">
+          <ac:chgData name="Matheus Nogueira" userId="3ffbdc37af4c2ab0" providerId="LiveId" clId="{4C4D23FA-B87B-4348-80D3-932FF489E74F}" dt="2021-05-07T22:48:45.640" v="309" actId="20577"/>
+          <ac:spMkLst>
+            <pc:docMk/>
+            <pc:sldMk cId="2641534292" sldId="261"/>
+            <ac:spMk id="3" creationId="{9BF78DD4-123E-4B19-AF8F-5E08AA1148B3}"/>
+          </ac:spMkLst>
+        </pc:spChg>
+        <pc:spChg chg="add mod">
+          <ac:chgData name="Matheus Nogueira" userId="3ffbdc37af4c2ab0" providerId="LiveId" clId="{4C4D23FA-B87B-4348-80D3-932FF489E74F}" dt="2021-05-07T22:48:59.774" v="315" actId="1076"/>
+          <ac:spMkLst>
+            <pc:docMk/>
+            <pc:sldMk cId="2641534292" sldId="261"/>
+            <ac:spMk id="4" creationId="{CE50B428-4276-49BF-89FD-5703591ADE89}"/>
+          </ac:spMkLst>
+        </pc:spChg>
+        <pc:picChg chg="add mod">
+          <ac:chgData name="Matheus Nogueira" userId="3ffbdc37af4c2ab0" providerId="LiveId" clId="{4C4D23FA-B87B-4348-80D3-932FF489E74F}" dt="2021-05-08T00:08:49.646" v="325" actId="1076"/>
+          <ac:picMkLst>
+            <pc:docMk/>
+            <pc:sldMk cId="2641534292" sldId="261"/>
+            <ac:picMk id="6" creationId="{686F62C0-6EE0-490D-A789-3D704C10131D}"/>
+          </ac:picMkLst>
+        </pc:picChg>
+        <pc:picChg chg="add mod">
+          <ac:chgData name="Matheus Nogueira" userId="3ffbdc37af4c2ab0" providerId="LiveId" clId="{4C4D23FA-B87B-4348-80D3-932FF489E74F}" dt="2021-05-08T00:09:50.327" v="328" actId="1076"/>
+          <ac:picMkLst>
+            <pc:docMk/>
+            <pc:sldMk cId="2641534292" sldId="261"/>
+            <ac:picMk id="8" creationId="{6EF16B3A-5E37-4B0A-8A77-0AF7EC34640D}"/>
+          </ac:picMkLst>
+        </pc:picChg>
+      </pc:sldChg>
+      <pc:sldChg chg="new">
+        <pc:chgData name="Matheus Nogueira" userId="3ffbdc37af4c2ab0" providerId="LiveId" clId="{4C4D23FA-B87B-4348-80D3-932FF489E74F}" dt="2021-05-08T00:10:20.612" v="333" actId="680"/>
+        <pc:sldMkLst>
+          <pc:docMk/>
+          <pc:sldMk cId="1616153697" sldId="262"/>
+        </pc:sldMkLst>
       </pc:sldChg>
     </pc:docChg>
   </pc:docChgLst>
 </pc:chgInfo>
+</file>
+
+<file path=ppt/comments/comment1.xml><?xml version="1.0" encoding="utf-8"?>
+<p:cmLst xmlns:a="http://schemas.openxmlformats.org/drawingml/2006/main" xmlns:r="http://schemas.openxmlformats.org/officeDocument/2006/relationships" xmlns:p="http://schemas.openxmlformats.org/presentationml/2006/main">
+  <p:cm authorId="1" dt="2021-05-07T19:23:12.482" idx="1">
+    <p:pos x="3297" y="1229"/>
+    <p:text>Curvas na ordem da legenda:
+bausca aleatoria
+experimento 1 = GA 1-1
+Nomr Linear = GA 2-1
+Elisitsmo = GA 2-2</p:text>
+    <p:extLst>
+      <p:ext uri="{C676402C-5697-4E1C-873F-D02D1690AC5C}">
+        <p15:threadingInfo xmlns:p15="http://schemas.microsoft.com/office/powerpoint/2012/main" timeZoneBias="180"/>
+      </p:ext>
+    </p:extLst>
+  </p:cm>
+  <p:cm authorId="1" dt="2021-05-07T19:29:32.809" idx="2">
+    <p:pos x="7028" y="1164"/>
+    <p:text>Busca aleatoria em Azul
+Steady State em Amarelo 
+Sem duplicados em azul
+Ambos com GAP de 80</p:text>
+    <p:extLst>
+      <p:ext uri="{C676402C-5697-4E1C-873F-D02D1690AC5C}">
+        <p15:threadingInfo xmlns:p15="http://schemas.microsoft.com/office/powerpoint/2012/main" timeZoneBias="180"/>
+      </p:ext>
+    </p:extLst>
+  </p:cm>
+</p:cmLst>
+</file>
+
+<file path=ppt/comments/comment2.xml><?xml version="1.0" encoding="utf-8"?>
+<p:cmLst xmlns:a="http://schemas.openxmlformats.org/drawingml/2006/main" xmlns:r="http://schemas.openxmlformats.org/officeDocument/2006/relationships" xmlns:p="http://schemas.openxmlformats.org/presentationml/2006/main">
+  <p:cm authorId="1" dt="2021-05-07T19:34:16.605" idx="3">
+    <p:pos x="3441" y="233"/>
+    <p:text>Cada Steady State i tem gap 5*i</p:text>
+    <p:extLst>
+      <p:ext uri="{C676402C-5697-4E1C-873F-D02D1690AC5C}">
+        <p15:threadingInfo xmlns:p15="http://schemas.microsoft.com/office/powerpoint/2012/main" timeZoneBias="180"/>
+      </p:ext>
+    </p:extLst>
+  </p:cm>
+  <p:cm authorId="1" dt="2021-05-07T19:35:48.426" idx="4">
+    <p:pos x="7180" y="233"/>
+    <p:text>O primeiro Steady State (1) é om GAP de 40</p:text>
+    <p:extLst>
+      <p:ext uri="{C676402C-5697-4E1C-873F-D02D1690AC5C}">
+        <p15:threadingInfo xmlns:p15="http://schemas.microsoft.com/office/powerpoint/2012/main" timeZoneBias="180"/>
+      </p:ext>
+    </p:extLst>
+  </p:cm>
+</p:cmLst>
+</file>
+
+<file path=ppt/comments/comment3.xml><?xml version="1.0" encoding="utf-8"?>
+<p:cmLst xmlns:a="http://schemas.openxmlformats.org/drawingml/2006/main" xmlns:r="http://schemas.openxmlformats.org/officeDocument/2006/relationships" xmlns:p="http://schemas.openxmlformats.org/presentationml/2006/main">
+  <p:cm authorId="1" dt="2021-05-07T19:37:28.873" idx="5">
+    <p:pos x="3690" y="252"/>
+    <p:text>Steady State (1) tem GAP 75</p:text>
+    <p:extLst>
+      <p:ext uri="{C676402C-5697-4E1C-873F-D02D1690AC5C}">
+        <p15:threadingInfo xmlns:p15="http://schemas.microsoft.com/office/powerpoint/2012/main" timeZoneBias="180"/>
+      </p:ext>
+    </p:extLst>
+  </p:cm>
+  <p:cm authorId="1" dt="2021-05-07T19:38:03.791" idx="6">
+    <p:pos x="3690" y="388"/>
+    <p:text>É o GAP ótimo</p:text>
+    <p:extLst>
+      <p:ext uri="{C676402C-5697-4E1C-873F-D02D1690AC5C}">
+        <p15:threadingInfo xmlns:p15="http://schemas.microsoft.com/office/powerpoint/2012/main" timeZoneBias="180">
+          <p15:parentCm authorId="1" idx="5"/>
+        </p15:threadingInfo>
+      </p:ext>
+    </p:extLst>
+  </p:cm>
+</p:cmLst>
+</file>
+
+<file path=ppt/comments/comment4.xml><?xml version="1.0" encoding="utf-8"?>
+<p:cmLst xmlns:a="http://schemas.openxmlformats.org/drawingml/2006/main" xmlns:r="http://schemas.openxmlformats.org/officeDocument/2006/relationships" xmlns:p="http://schemas.openxmlformats.org/presentationml/2006/main">
+  <p:cm authorId="1" dt="2021-05-07T19:39:40.817" idx="7">
+    <p:pos x="5979" y="150"/>
+    <p:text>Crossover 10 e mutacao 80</p:text>
+    <p:extLst>
+      <p:ext uri="{C676402C-5697-4E1C-873F-D02D1690AC5C}">
+        <p15:threadingInfo xmlns:p15="http://schemas.microsoft.com/office/powerpoint/2012/main" timeZoneBias="180"/>
+      </p:ext>
+    </p:extLst>
+  </p:cm>
+  <p:cm authorId="1" dt="2021-05-07T19:39:59.607" idx="8">
+    <p:pos x="5979" y="286"/>
+    <p:text>Omodelo não evolui!!</p:text>
+    <p:extLst>
+      <p:ext uri="{C676402C-5697-4E1C-873F-D02D1690AC5C}">
+        <p15:threadingInfo xmlns:p15="http://schemas.microsoft.com/office/powerpoint/2012/main" timeZoneBias="180">
+          <p15:parentCm authorId="1" idx="7"/>
+        </p15:threadingInfo>
+      </p:ext>
+    </p:extLst>
+  </p:cm>
+  <p:cm authorId="1" dt="2021-05-07T19:40:19.111" idx="9">
+    <p:pos x="5979" y="422"/>
+    <p:text>Taxa alta demais de mutação faz com que pratocamente tenhamos uma busca aleatoria?</p:text>
+    <p:extLst>
+      <p:ext uri="{C676402C-5697-4E1C-873F-D02D1690AC5C}">
+        <p15:threadingInfo xmlns:p15="http://schemas.microsoft.com/office/powerpoint/2012/main" timeZoneBias="180">
+          <p15:parentCm authorId="1" idx="7"/>
+        </p15:threadingInfo>
+      </p:ext>
+    </p:extLst>
+  </p:cm>
+</p:cmLst>
+</file>
+
+<file path=ppt/comments/comment5.xml><?xml version="1.0" encoding="utf-8"?>
+<p:cmLst xmlns:a="http://schemas.openxmlformats.org/drawingml/2006/main" xmlns:r="http://schemas.openxmlformats.org/officeDocument/2006/relationships" xmlns:p="http://schemas.openxmlformats.org/presentationml/2006/main">
+  <p:cm authorId="1" dt="2021-05-07T19:47:17.301" idx="10">
+    <p:pos x="7161" y="546"/>
+    <p:text>A ordem da legenda é a mesma do texto</p:text>
+    <p:extLst>
+      <p:ext uri="{C676402C-5697-4E1C-873F-D02D1690AC5C}">
+        <p15:threadingInfo xmlns:p15="http://schemas.microsoft.com/office/powerpoint/2012/main" timeZoneBias="180"/>
+      </p:ext>
+    </p:extLst>
+  </p:cm>
+</p:cmLst>
+</file>
+
+<file path=ppt/comments/comment6.xml><?xml version="1.0" encoding="utf-8"?>
+<p:cmLst xmlns:a="http://schemas.openxmlformats.org/drawingml/2006/main" xmlns:r="http://schemas.openxmlformats.org/officeDocument/2006/relationships" xmlns:p="http://schemas.openxmlformats.org/presentationml/2006/main">
+  <p:cm authorId="1" dt="2021-05-07T21:09:52.068" idx="11">
+    <p:pos x="7554" y="792"/>
+    <p:text>Não vale a pena. O elitismo já obteve uma boa resposta</p:text>
+    <p:extLst>
+      <p:ext uri="{C676402C-5697-4E1C-873F-D02D1690AC5C}">
+        <p15:threadingInfo xmlns:p15="http://schemas.microsoft.com/office/powerpoint/2012/main" timeZoneBias="180"/>
+      </p:ext>
+    </p:extLst>
+  </p:cm>
+  <p:cm authorId="1" dt="2021-05-07T21:10:07.201" idx="12">
+    <p:pos x="3840" y="730"/>
+    <p:text>Parece que valeu a pena no caso sem elitismo</p:text>
+    <p:extLst>
+      <p:ext uri="{C676402C-5697-4E1C-873F-D02D1690AC5C}">
+        <p15:threadingInfo xmlns:p15="http://schemas.microsoft.com/office/powerpoint/2012/main" timeZoneBias="180"/>
+      </p:ext>
+    </p:extLst>
+  </p:cm>
+</p:cmLst>
 </file>
 
 <file path=ppt/slideLayouts/slideLayout1.xml><?xml version="1.0" encoding="utf-8"?>
@@ -3409,8 +3801,103 @@
         </p:blipFill>
         <p:spPr>
           <a:xfrm>
-            <a:off x="1487572" y="1121085"/>
+            <a:off x="306842" y="449231"/>
             <a:ext cx="7849695" cy="1295581"/>
+          </a:xfrm>
+          <a:prstGeom prst="rect">
+            <a:avLst/>
+          </a:prstGeom>
+        </p:spPr>
+      </p:pic>
+      <p:sp>
+        <p:nvSpPr>
+          <p:cNvPr id="2" name="TextBox 1">
+            <a:extLst>
+              <a:ext uri="{FF2B5EF4-FFF2-40B4-BE49-F238E27FC236}">
+                <a16:creationId xmlns:a16="http://schemas.microsoft.com/office/drawing/2014/main" id="{6BED7C09-A787-4222-8E85-A9B1F53AC54E}"/>
+              </a:ext>
+            </a:extLst>
+          </p:cNvPr>
+          <p:cNvSpPr txBox="1"/>
+          <p:nvPr/>
+        </p:nvSpPr>
+        <p:spPr>
+          <a:xfrm>
+            <a:off x="133165" y="79899"/>
+            <a:ext cx="1141082" cy="369332"/>
+          </a:xfrm>
+          <a:prstGeom prst="rect">
+            <a:avLst/>
+          </a:prstGeom>
+          <a:noFill/>
+        </p:spPr>
+        <p:txBody>
+          <a:bodyPr wrap="none" rtlCol="0">
+            <a:spAutoFit/>
+          </a:bodyPr>
+          <a:lstStyle/>
+          <a:p>
+            <a:r>
+              <a:rPr lang="pt-BR" dirty="0"/>
+              <a:t>Questao 1</a:t>
+            </a:r>
+          </a:p>
+        </p:txBody>
+      </p:sp>
+      <p:pic>
+        <p:nvPicPr>
+          <p:cNvPr id="4" name="Picture 3">
+            <a:extLst>
+              <a:ext uri="{FF2B5EF4-FFF2-40B4-BE49-F238E27FC236}">
+                <a16:creationId xmlns:a16="http://schemas.microsoft.com/office/drawing/2014/main" id="{80867CCE-5977-448D-990F-ACC0C7ED3800}"/>
+              </a:ext>
+            </a:extLst>
+          </p:cNvPr>
+          <p:cNvPicPr>
+            <a:picLocks noChangeAspect="1"/>
+          </p:cNvPicPr>
+          <p:nvPr/>
+        </p:nvPicPr>
+        <p:blipFill>
+          <a:blip r:embed="rId3"/>
+          <a:stretch>
+            <a:fillRect/>
+          </a:stretch>
+        </p:blipFill>
+        <p:spPr>
+          <a:xfrm>
+            <a:off x="207266" y="1950522"/>
+            <a:ext cx="5026668" cy="4723517"/>
+          </a:xfrm>
+          <a:prstGeom prst="rect">
+            <a:avLst/>
+          </a:prstGeom>
+        </p:spPr>
+      </p:pic>
+      <p:pic>
+        <p:nvPicPr>
+          <p:cNvPr id="7" name="Picture 6">
+            <a:extLst>
+              <a:ext uri="{FF2B5EF4-FFF2-40B4-BE49-F238E27FC236}">
+                <a16:creationId xmlns:a16="http://schemas.microsoft.com/office/drawing/2014/main" id="{5FFD35E8-730B-4EFF-8CF5-2CDB86AAB757}"/>
+              </a:ext>
+            </a:extLst>
+          </p:cNvPr>
+          <p:cNvPicPr>
+            <a:picLocks noChangeAspect="1"/>
+          </p:cNvPicPr>
+          <p:nvPr/>
+        </p:nvPicPr>
+        <p:blipFill>
+          <a:blip r:embed="rId4"/>
+          <a:stretch>
+            <a:fillRect/>
+          </a:stretch>
+        </p:blipFill>
+        <p:spPr>
+          <a:xfrm>
+            <a:off x="5904882" y="1848030"/>
+            <a:ext cx="5252646" cy="4928499"/>
           </a:xfrm>
           <a:prstGeom prst="rect">
             <a:avLst/>
@@ -3421,6 +3908,636 @@
     <p:extLst>
       <p:ext uri="{BB962C8B-B14F-4D97-AF65-F5344CB8AC3E}">
         <p14:creationId xmlns:p14="http://schemas.microsoft.com/office/powerpoint/2010/main" val="412350758"/>
+      </p:ext>
+    </p:extLst>
+  </p:cSld>
+  <p:clrMapOvr>
+    <a:masterClrMapping/>
+  </p:clrMapOvr>
+</p:sld>
+</file>
+
+<file path=ppt/slides/slide2.xml><?xml version="1.0" encoding="utf-8"?>
+<p:sld xmlns:a="http://schemas.openxmlformats.org/drawingml/2006/main" xmlns:r="http://schemas.openxmlformats.org/officeDocument/2006/relationships" xmlns:p="http://schemas.openxmlformats.org/presentationml/2006/main">
+  <p:cSld>
+    <p:spTree>
+      <p:nvGrpSpPr>
+        <p:cNvPr id="1" name=""/>
+        <p:cNvGrpSpPr/>
+        <p:nvPr/>
+      </p:nvGrpSpPr>
+      <p:grpSpPr>
+        <a:xfrm>
+          <a:off x="0" y="0"/>
+          <a:ext cx="0" cy="0"/>
+          <a:chOff x="0" y="0"/>
+          <a:chExt cx="0" cy="0"/>
+        </a:xfrm>
+      </p:grpSpPr>
+      <p:sp>
+        <p:nvSpPr>
+          <p:cNvPr id="4" name="TextBox 3">
+            <a:extLst>
+              <a:ext uri="{FF2B5EF4-FFF2-40B4-BE49-F238E27FC236}">
+                <a16:creationId xmlns:a16="http://schemas.microsoft.com/office/drawing/2014/main" id="{8AB1220E-D807-447E-9899-C40AF2E33761}"/>
+              </a:ext>
+            </a:extLst>
+          </p:cNvPr>
+          <p:cNvSpPr txBox="1"/>
+          <p:nvPr/>
+        </p:nvSpPr>
+        <p:spPr>
+          <a:xfrm>
+            <a:off x="0" y="0"/>
+            <a:ext cx="1141082" cy="369332"/>
+          </a:xfrm>
+          <a:prstGeom prst="rect">
+            <a:avLst/>
+          </a:prstGeom>
+          <a:noFill/>
+        </p:spPr>
+        <p:txBody>
+          <a:bodyPr wrap="none" rtlCol="0">
+            <a:spAutoFit/>
+          </a:bodyPr>
+          <a:lstStyle/>
+          <a:p>
+            <a:r>
+              <a:rPr lang="pt-BR" dirty="0"/>
+              <a:t>Questão 2</a:t>
+            </a:r>
+          </a:p>
+        </p:txBody>
+      </p:sp>
+      <p:pic>
+        <p:nvPicPr>
+          <p:cNvPr id="6" name="Picture 5">
+            <a:extLst>
+              <a:ext uri="{FF2B5EF4-FFF2-40B4-BE49-F238E27FC236}">
+                <a16:creationId xmlns:a16="http://schemas.microsoft.com/office/drawing/2014/main" id="{73319262-EF31-4977-B153-44422F4258F2}"/>
+              </a:ext>
+            </a:extLst>
+          </p:cNvPr>
+          <p:cNvPicPr>
+            <a:picLocks noChangeAspect="1"/>
+          </p:cNvPicPr>
+          <p:nvPr/>
+        </p:nvPicPr>
+        <p:blipFill>
+          <a:blip r:embed="rId2"/>
+          <a:stretch>
+            <a:fillRect/>
+          </a:stretch>
+        </p:blipFill>
+        <p:spPr>
+          <a:xfrm>
+            <a:off x="0" y="369332"/>
+            <a:ext cx="5462494" cy="5124450"/>
+          </a:xfrm>
+          <a:prstGeom prst="rect">
+            <a:avLst/>
+          </a:prstGeom>
+        </p:spPr>
+      </p:pic>
+      <p:pic>
+        <p:nvPicPr>
+          <p:cNvPr id="8" name="Picture 7">
+            <a:extLst>
+              <a:ext uri="{FF2B5EF4-FFF2-40B4-BE49-F238E27FC236}">
+                <a16:creationId xmlns:a16="http://schemas.microsoft.com/office/drawing/2014/main" id="{903C9CE5-ECEF-49E8-980A-0719B87B2023}"/>
+              </a:ext>
+            </a:extLst>
+          </p:cNvPr>
+          <p:cNvPicPr>
+            <a:picLocks noChangeAspect="1"/>
+          </p:cNvPicPr>
+          <p:nvPr/>
+        </p:nvPicPr>
+        <p:blipFill>
+          <a:blip r:embed="rId3"/>
+          <a:stretch>
+            <a:fillRect/>
+          </a:stretch>
+        </p:blipFill>
+        <p:spPr>
+          <a:xfrm>
+            <a:off x="6002008" y="369332"/>
+            <a:ext cx="5395665" cy="5062225"/>
+          </a:xfrm>
+          <a:prstGeom prst="rect">
+            <a:avLst/>
+          </a:prstGeom>
+        </p:spPr>
+      </p:pic>
+    </p:spTree>
+    <p:extLst>
+      <p:ext uri="{BB962C8B-B14F-4D97-AF65-F5344CB8AC3E}">
+        <p14:creationId xmlns:p14="http://schemas.microsoft.com/office/powerpoint/2010/main" val="2679752602"/>
+      </p:ext>
+    </p:extLst>
+  </p:cSld>
+  <p:clrMapOvr>
+    <a:masterClrMapping/>
+  </p:clrMapOvr>
+</p:sld>
+</file>
+
+<file path=ppt/slides/slide3.xml><?xml version="1.0" encoding="utf-8"?>
+<p:sld xmlns:a="http://schemas.openxmlformats.org/drawingml/2006/main" xmlns:r="http://schemas.openxmlformats.org/officeDocument/2006/relationships" xmlns:p="http://schemas.openxmlformats.org/presentationml/2006/main">
+  <p:cSld>
+    <p:spTree>
+      <p:nvGrpSpPr>
+        <p:cNvPr id="1" name=""/>
+        <p:cNvGrpSpPr/>
+        <p:nvPr/>
+      </p:nvGrpSpPr>
+      <p:grpSpPr>
+        <a:xfrm>
+          <a:off x="0" y="0"/>
+          <a:ext cx="0" cy="0"/>
+          <a:chOff x="0" y="0"/>
+          <a:chExt cx="0" cy="0"/>
+        </a:xfrm>
+      </p:grpSpPr>
+      <p:pic>
+        <p:nvPicPr>
+          <p:cNvPr id="3" name="Picture 2">
+            <a:extLst>
+              <a:ext uri="{FF2B5EF4-FFF2-40B4-BE49-F238E27FC236}">
+                <a16:creationId xmlns:a16="http://schemas.microsoft.com/office/drawing/2014/main" id="{EB158BA6-BF11-4478-AD55-25C163C74168}"/>
+              </a:ext>
+            </a:extLst>
+          </p:cNvPr>
+          <p:cNvPicPr>
+            <a:picLocks noChangeAspect="1"/>
+          </p:cNvPicPr>
+          <p:nvPr/>
+        </p:nvPicPr>
+        <p:blipFill>
+          <a:blip r:embed="rId2"/>
+          <a:stretch>
+            <a:fillRect/>
+          </a:stretch>
+        </p:blipFill>
+        <p:spPr>
+          <a:xfrm>
+            <a:off x="156689" y="400050"/>
+            <a:ext cx="5700518" cy="5348732"/>
+          </a:xfrm>
+          <a:prstGeom prst="rect">
+            <a:avLst/>
+          </a:prstGeom>
+        </p:spPr>
+      </p:pic>
+    </p:spTree>
+    <p:extLst>
+      <p:ext uri="{BB962C8B-B14F-4D97-AF65-F5344CB8AC3E}">
+        <p14:creationId xmlns:p14="http://schemas.microsoft.com/office/powerpoint/2010/main" val="923749177"/>
+      </p:ext>
+    </p:extLst>
+  </p:cSld>
+  <p:clrMapOvr>
+    <a:masterClrMapping/>
+  </p:clrMapOvr>
+</p:sld>
+</file>
+
+<file path=ppt/slides/slide4.xml><?xml version="1.0" encoding="utf-8"?>
+<p:sld xmlns:a="http://schemas.openxmlformats.org/drawingml/2006/main" xmlns:r="http://schemas.openxmlformats.org/officeDocument/2006/relationships" xmlns:p="http://schemas.openxmlformats.org/presentationml/2006/main">
+  <p:cSld>
+    <p:spTree>
+      <p:nvGrpSpPr>
+        <p:cNvPr id="1" name=""/>
+        <p:cNvGrpSpPr/>
+        <p:nvPr/>
+      </p:nvGrpSpPr>
+      <p:grpSpPr>
+        <a:xfrm>
+          <a:off x="0" y="0"/>
+          <a:ext cx="0" cy="0"/>
+          <a:chOff x="0" y="0"/>
+          <a:chExt cx="0" cy="0"/>
+        </a:xfrm>
+      </p:grpSpPr>
+      <p:sp>
+        <p:nvSpPr>
+          <p:cNvPr id="2" name="TextBox 1">
+            <a:extLst>
+              <a:ext uri="{FF2B5EF4-FFF2-40B4-BE49-F238E27FC236}">
+                <a16:creationId xmlns:a16="http://schemas.microsoft.com/office/drawing/2014/main" id="{D9FCDD0F-EC9D-43A5-9253-2C00A987DD2F}"/>
+              </a:ext>
+            </a:extLst>
+          </p:cNvPr>
+          <p:cNvSpPr txBox="1"/>
+          <p:nvPr/>
+        </p:nvSpPr>
+        <p:spPr>
+          <a:xfrm>
+            <a:off x="434109" y="184727"/>
+            <a:ext cx="1141082" cy="369332"/>
+          </a:xfrm>
+          <a:prstGeom prst="rect">
+            <a:avLst/>
+          </a:prstGeom>
+          <a:noFill/>
+        </p:spPr>
+        <p:txBody>
+          <a:bodyPr wrap="none" rtlCol="0">
+            <a:spAutoFit/>
+          </a:bodyPr>
+          <a:lstStyle/>
+          <a:p>
+            <a:r>
+              <a:rPr lang="pt-BR" dirty="0"/>
+              <a:t>Questão 3</a:t>
+            </a:r>
+          </a:p>
+        </p:txBody>
+      </p:sp>
+      <p:pic>
+        <p:nvPicPr>
+          <p:cNvPr id="8" name="Picture 7">
+            <a:extLst>
+              <a:ext uri="{FF2B5EF4-FFF2-40B4-BE49-F238E27FC236}">
+                <a16:creationId xmlns:a16="http://schemas.microsoft.com/office/drawing/2014/main" id="{B0C8D825-8682-49F0-8250-64DA7F354AB0}"/>
+              </a:ext>
+            </a:extLst>
+          </p:cNvPr>
+          <p:cNvPicPr>
+            <a:picLocks noChangeAspect="1"/>
+          </p:cNvPicPr>
+          <p:nvPr/>
+        </p:nvPicPr>
+        <p:blipFill>
+          <a:blip r:embed="rId2"/>
+          <a:stretch>
+            <a:fillRect/>
+          </a:stretch>
+        </p:blipFill>
+        <p:spPr>
+          <a:xfrm>
+            <a:off x="2704626" y="242443"/>
+            <a:ext cx="6782747" cy="6373114"/>
+          </a:xfrm>
+          <a:prstGeom prst="rect">
+            <a:avLst/>
+          </a:prstGeom>
+        </p:spPr>
+      </p:pic>
+    </p:spTree>
+    <p:extLst>
+      <p:ext uri="{BB962C8B-B14F-4D97-AF65-F5344CB8AC3E}">
+        <p14:creationId xmlns:p14="http://schemas.microsoft.com/office/powerpoint/2010/main" val="2366513634"/>
+      </p:ext>
+    </p:extLst>
+  </p:cSld>
+  <p:clrMapOvr>
+    <a:masterClrMapping/>
+  </p:clrMapOvr>
+</p:sld>
+</file>
+
+<file path=ppt/slides/slide5.xml><?xml version="1.0" encoding="utf-8"?>
+<p:sld xmlns:a="http://schemas.openxmlformats.org/drawingml/2006/main" xmlns:r="http://schemas.openxmlformats.org/officeDocument/2006/relationships" xmlns:p="http://schemas.openxmlformats.org/presentationml/2006/main">
+  <p:cSld>
+    <p:spTree>
+      <p:nvGrpSpPr>
+        <p:cNvPr id="1" name=""/>
+        <p:cNvGrpSpPr/>
+        <p:nvPr/>
+      </p:nvGrpSpPr>
+      <p:grpSpPr>
+        <a:xfrm>
+          <a:off x="0" y="0"/>
+          <a:ext cx="0" cy="0"/>
+          <a:chOff x="0" y="0"/>
+          <a:chExt cx="0" cy="0"/>
+        </a:xfrm>
+      </p:grpSpPr>
+      <p:sp>
+        <p:nvSpPr>
+          <p:cNvPr id="2" name="TextBox 1">
+            <a:extLst>
+              <a:ext uri="{FF2B5EF4-FFF2-40B4-BE49-F238E27FC236}">
+                <a16:creationId xmlns:a16="http://schemas.microsoft.com/office/drawing/2014/main" id="{18CDB68C-2DF4-4C3F-A62F-2DBEDE31EED2}"/>
+              </a:ext>
+            </a:extLst>
+          </p:cNvPr>
+          <p:cNvSpPr txBox="1"/>
+          <p:nvPr/>
+        </p:nvSpPr>
+        <p:spPr>
+          <a:xfrm>
+            <a:off x="434109" y="184727"/>
+            <a:ext cx="5948167" cy="1754326"/>
+          </a:xfrm>
+          <a:prstGeom prst="rect">
+            <a:avLst/>
+          </a:prstGeom>
+          <a:noFill/>
+        </p:spPr>
+        <p:txBody>
+          <a:bodyPr wrap="none" rtlCol="0">
+            <a:spAutoFit/>
+          </a:bodyPr>
+          <a:lstStyle/>
+          <a:p>
+            <a:r>
+              <a:rPr lang="pt-BR" dirty="0"/>
+              <a:t>Questão 4 GA 2-2</a:t>
+            </a:r>
+          </a:p>
+          <a:p>
+            <a:r>
+              <a:rPr lang="pt-BR" dirty="0"/>
+              <a:t>Conta Importante: avaliações = tamanho_pop * gerações (40)</a:t>
+            </a:r>
+          </a:p>
+          <a:p>
+            <a:r>
+              <a:rPr lang="pt-BR" dirty="0"/>
+              <a:t>Tam_pop = 20 -&gt; avali = 800</a:t>
+            </a:r>
+          </a:p>
+          <a:p>
+            <a:r>
+              <a:rPr lang="pt-BR" dirty="0"/>
+              <a:t>Tam_pop = 50 -&gt; avali = 2000</a:t>
+            </a:r>
+          </a:p>
+          <a:p>
+            <a:r>
+              <a:rPr lang="pt-BR" dirty="0"/>
+              <a:t>Tam_pop = 100 -&gt; avali = 4000</a:t>
+            </a:r>
+          </a:p>
+          <a:p>
+            <a:r>
+              <a:rPr lang="pt-BR" dirty="0"/>
+              <a:t>Tam_pop = 150 -&gt; avali = 6000</a:t>
+            </a:r>
+          </a:p>
+        </p:txBody>
+      </p:sp>
+      <p:pic>
+        <p:nvPicPr>
+          <p:cNvPr id="6" name="Picture 5">
+            <a:extLst>
+              <a:ext uri="{FF2B5EF4-FFF2-40B4-BE49-F238E27FC236}">
+                <a16:creationId xmlns:a16="http://schemas.microsoft.com/office/drawing/2014/main" id="{DBB40983-2413-49A2-AF90-7E5ECDF728BD}"/>
+              </a:ext>
+            </a:extLst>
+          </p:cNvPr>
+          <p:cNvPicPr>
+            <a:picLocks noChangeAspect="1"/>
+          </p:cNvPicPr>
+          <p:nvPr/>
+        </p:nvPicPr>
+        <p:blipFill>
+          <a:blip r:embed="rId2"/>
+          <a:stretch>
+            <a:fillRect/>
+          </a:stretch>
+        </p:blipFill>
+        <p:spPr>
+          <a:xfrm>
+            <a:off x="5047778" y="857249"/>
+            <a:ext cx="6105170" cy="5744019"/>
+          </a:xfrm>
+          <a:prstGeom prst="rect">
+            <a:avLst/>
+          </a:prstGeom>
+        </p:spPr>
+      </p:pic>
+    </p:spTree>
+    <p:extLst>
+      <p:ext uri="{BB962C8B-B14F-4D97-AF65-F5344CB8AC3E}">
+        <p14:creationId xmlns:p14="http://schemas.microsoft.com/office/powerpoint/2010/main" val="2421346254"/>
+      </p:ext>
+    </p:extLst>
+  </p:cSld>
+  <p:clrMapOvr>
+    <a:masterClrMapping/>
+  </p:clrMapOvr>
+</p:sld>
+</file>
+
+<file path=ppt/slides/slide6.xml><?xml version="1.0" encoding="utf-8"?>
+<p:sld xmlns:a="http://schemas.openxmlformats.org/drawingml/2006/main" xmlns:r="http://schemas.openxmlformats.org/officeDocument/2006/relationships" xmlns:p="http://schemas.openxmlformats.org/presentationml/2006/main">
+  <p:cSld>
+    <p:spTree>
+      <p:nvGrpSpPr>
+        <p:cNvPr id="1" name=""/>
+        <p:cNvGrpSpPr/>
+        <p:nvPr/>
+      </p:nvGrpSpPr>
+      <p:grpSpPr>
+        <a:xfrm>
+          <a:off x="0" y="0"/>
+          <a:ext cx="0" cy="0"/>
+          <a:chOff x="0" y="0"/>
+          <a:chExt cx="0" cy="0"/>
+        </a:xfrm>
+      </p:grpSpPr>
+      <p:sp>
+        <p:nvSpPr>
+          <p:cNvPr id="2" name="TextBox 1">
+            <a:extLst>
+              <a:ext uri="{FF2B5EF4-FFF2-40B4-BE49-F238E27FC236}">
+                <a16:creationId xmlns:a16="http://schemas.microsoft.com/office/drawing/2014/main" id="{935A26CB-FC70-4CF5-927E-C35CCD9FDE74}"/>
+              </a:ext>
+            </a:extLst>
+          </p:cNvPr>
+          <p:cNvSpPr txBox="1"/>
+          <p:nvPr/>
+        </p:nvSpPr>
+        <p:spPr>
+          <a:xfrm>
+            <a:off x="434109" y="184727"/>
+            <a:ext cx="1141082" cy="369332"/>
+          </a:xfrm>
+          <a:prstGeom prst="rect">
+            <a:avLst/>
+          </a:prstGeom>
+          <a:noFill/>
+        </p:spPr>
+        <p:txBody>
+          <a:bodyPr wrap="none" rtlCol="0">
+            <a:spAutoFit/>
+          </a:bodyPr>
+          <a:lstStyle/>
+          <a:p>
+            <a:r>
+              <a:rPr lang="pt-BR" dirty="0"/>
+              <a:t>Questão 5</a:t>
+            </a:r>
+          </a:p>
+        </p:txBody>
+      </p:sp>
+      <p:sp>
+        <p:nvSpPr>
+          <p:cNvPr id="3" name="TextBox 2">
+            <a:extLst>
+              <a:ext uri="{FF2B5EF4-FFF2-40B4-BE49-F238E27FC236}">
+                <a16:creationId xmlns:a16="http://schemas.microsoft.com/office/drawing/2014/main" id="{9BF78DD4-123E-4B19-AF8F-5E08AA1148B3}"/>
+              </a:ext>
+            </a:extLst>
+          </p:cNvPr>
+          <p:cNvSpPr txBox="1"/>
+          <p:nvPr/>
+        </p:nvSpPr>
+        <p:spPr>
+          <a:xfrm>
+            <a:off x="434109" y="789709"/>
+            <a:ext cx="821059" cy="369332"/>
+          </a:xfrm>
+          <a:prstGeom prst="rect">
+            <a:avLst/>
+          </a:prstGeom>
+          <a:noFill/>
+        </p:spPr>
+        <p:txBody>
+          <a:bodyPr wrap="none" rtlCol="0">
+            <a:spAutoFit/>
+          </a:bodyPr>
+          <a:lstStyle/>
+          <a:p>
+            <a:r>
+              <a:rPr lang="pt-BR" dirty="0"/>
+              <a:t>GA 2-1</a:t>
+            </a:r>
+          </a:p>
+        </p:txBody>
+      </p:sp>
+      <p:sp>
+        <p:nvSpPr>
+          <p:cNvPr id="4" name="TextBox 3">
+            <a:extLst>
+              <a:ext uri="{FF2B5EF4-FFF2-40B4-BE49-F238E27FC236}">
+                <a16:creationId xmlns:a16="http://schemas.microsoft.com/office/drawing/2014/main" id="{CE50B428-4276-49BF-89FD-5703591ADE89}"/>
+              </a:ext>
+            </a:extLst>
+          </p:cNvPr>
+          <p:cNvSpPr txBox="1"/>
+          <p:nvPr/>
+        </p:nvSpPr>
+        <p:spPr>
+          <a:xfrm>
+            <a:off x="11079018" y="281709"/>
+            <a:ext cx="821059" cy="369332"/>
+          </a:xfrm>
+          <a:prstGeom prst="rect">
+            <a:avLst/>
+          </a:prstGeom>
+          <a:noFill/>
+        </p:spPr>
+        <p:txBody>
+          <a:bodyPr wrap="square" rtlCol="0">
+            <a:spAutoFit/>
+          </a:bodyPr>
+          <a:lstStyle/>
+          <a:p>
+            <a:r>
+              <a:rPr lang="pt-BR" dirty="0"/>
+              <a:t>GA 2-2</a:t>
+            </a:r>
+          </a:p>
+        </p:txBody>
+      </p:sp>
+      <p:pic>
+        <p:nvPicPr>
+          <p:cNvPr id="6" name="Picture 5">
+            <a:extLst>
+              <a:ext uri="{FF2B5EF4-FFF2-40B4-BE49-F238E27FC236}">
+                <a16:creationId xmlns:a16="http://schemas.microsoft.com/office/drawing/2014/main" id="{686F62C0-6EE0-490D-A789-3D704C10131D}"/>
+              </a:ext>
+            </a:extLst>
+          </p:cNvPr>
+          <p:cNvPicPr>
+            <a:picLocks noChangeAspect="1"/>
+          </p:cNvPicPr>
+          <p:nvPr/>
+        </p:nvPicPr>
+        <p:blipFill>
+          <a:blip r:embed="rId2"/>
+          <a:stretch>
+            <a:fillRect/>
+          </a:stretch>
+        </p:blipFill>
+        <p:spPr>
+          <a:xfrm>
+            <a:off x="301472" y="1159041"/>
+            <a:ext cx="5794528" cy="5451753"/>
+          </a:xfrm>
+          <a:prstGeom prst="rect">
+            <a:avLst/>
+          </a:prstGeom>
+        </p:spPr>
+      </p:pic>
+      <p:pic>
+        <p:nvPicPr>
+          <p:cNvPr id="8" name="Picture 7">
+            <a:extLst>
+              <a:ext uri="{FF2B5EF4-FFF2-40B4-BE49-F238E27FC236}">
+                <a16:creationId xmlns:a16="http://schemas.microsoft.com/office/drawing/2014/main" id="{6EF16B3A-5E37-4B0A-8A77-0AF7EC34640D}"/>
+              </a:ext>
+            </a:extLst>
+          </p:cNvPr>
+          <p:cNvPicPr>
+            <a:picLocks noChangeAspect="1"/>
+          </p:cNvPicPr>
+          <p:nvPr/>
+        </p:nvPicPr>
+        <p:blipFill>
+          <a:blip r:embed="rId3"/>
+          <a:stretch>
+            <a:fillRect/>
+          </a:stretch>
+        </p:blipFill>
+        <p:spPr>
+          <a:xfrm>
+            <a:off x="6286027" y="1257300"/>
+            <a:ext cx="5706120" cy="5353494"/>
+          </a:xfrm>
+          <a:prstGeom prst="rect">
+            <a:avLst/>
+          </a:prstGeom>
+        </p:spPr>
+      </p:pic>
+    </p:spTree>
+    <p:extLst>
+      <p:ext uri="{BB962C8B-B14F-4D97-AF65-F5344CB8AC3E}">
+        <p14:creationId xmlns:p14="http://schemas.microsoft.com/office/powerpoint/2010/main" val="2641534292"/>
+      </p:ext>
+    </p:extLst>
+  </p:cSld>
+  <p:clrMapOvr>
+    <a:masterClrMapping/>
+  </p:clrMapOvr>
+</p:sld>
+</file>
+
+<file path=ppt/slides/slide7.xml><?xml version="1.0" encoding="utf-8"?>
+<p:sld xmlns:a="http://schemas.openxmlformats.org/drawingml/2006/main" xmlns:r="http://schemas.openxmlformats.org/officeDocument/2006/relationships" xmlns:p="http://schemas.openxmlformats.org/presentationml/2006/main">
+  <p:cSld>
+    <p:spTree>
+      <p:nvGrpSpPr>
+        <p:cNvPr id="1" name=""/>
+        <p:cNvGrpSpPr/>
+        <p:nvPr/>
+      </p:nvGrpSpPr>
+      <p:grpSpPr>
+        <a:xfrm>
+          <a:off x="0" y="0"/>
+          <a:ext cx="0" cy="0"/>
+          <a:chOff x="0" y="0"/>
+          <a:chExt cx="0" cy="0"/>
+        </a:xfrm>
+      </p:grpSpPr>
+    </p:spTree>
+    <p:extLst>
+      <p:ext uri="{BB962C8B-B14F-4D97-AF65-F5344CB8AC3E}">
+        <p14:creationId xmlns:p14="http://schemas.microsoft.com/office/powerpoint/2010/main" val="1616153697"/>
       </p:ext>
     </p:extLst>
   </p:cSld>

</xml_diff>

<commit_message>
imagens geradas para todos menos 8
</commit_message>
<xml_diff>
--- a/GA/Trabalho1/prints.pptx
+++ b/GA/Trabalho1/prints.pptx
@@ -12,6 +12,7 @@
     <p:sldId id="260" r:id="rId6"/>
     <p:sldId id="261" r:id="rId7"/>
     <p:sldId id="262" r:id="rId8"/>
+    <p:sldId id="263" r:id="rId9"/>
   </p:sldIdLst>
   <p:sldSz cx="12192000" cy="6858000"/>
   <p:notesSz cx="6858000" cy="9144000"/>
@@ -120,7 +121,7 @@
 
 <file path=ppt/commentAuthors.xml><?xml version="1.0" encoding="utf-8"?>
 <p:cmAuthorLst xmlns:a="http://schemas.openxmlformats.org/drawingml/2006/main" xmlns:r="http://schemas.openxmlformats.org/officeDocument/2006/relationships" xmlns:p="http://schemas.openxmlformats.org/presentationml/2006/main">
-  <p:cmAuthor id="1" name="Matheus Nogueira" initials="MN" lastIdx="12" clrIdx="0">
+  <p:cmAuthor id="1" name="Matheus Nogueira" initials="MN" lastIdx="14" clrIdx="0">
     <p:extLst>
       <p:ext uri="{19B8F6BF-5375-455C-9EA6-DF929625EA0E}">
         <p15:presenceInfo xmlns:p15="http://schemas.microsoft.com/office/powerpoint/2012/main" userId="3ffbdc37af4c2ab0" providerId="Windows Live"/>
@@ -133,7 +134,7 @@
 <file path=ppt/revisionInfo.xml><?xml version="1.0" encoding="utf-8"?>
 <p1510:revInfo xmlns:a="http://schemas.openxmlformats.org/drawingml/2006/main" xmlns:r="http://schemas.openxmlformats.org/officeDocument/2006/relationships" xmlns:p1510="http://schemas.microsoft.com/office/powerpoint/2015/10/main">
   <p1510:revLst>
-    <p1510:client id="{4C4D23FA-B87B-4348-80D3-932FF489E74F}" v="19" dt="2021-05-08T00:10:16.009"/>
+    <p1510:client id="{4C4D23FA-B87B-4348-80D3-932FF489E74F}" v="25" dt="2021-05-08T00:38:42.167"/>
   </p1510:revLst>
 </p1510:revInfo>
 </file>
@@ -143,7 +144,7 @@
   <pc:docChgLst>
     <pc:chgData name="Matheus Nogueira" userId="3ffbdc37af4c2ab0" providerId="LiveId" clId="{4C4D23FA-B87B-4348-80D3-932FF489E74F}"/>
     <pc:docChg chg="custSel addSld modSld">
-      <pc:chgData name="Matheus Nogueira" userId="3ffbdc37af4c2ab0" providerId="LiveId" clId="{4C4D23FA-B87B-4348-80D3-932FF489E74F}" dt="2021-05-08T00:10:20.612" v="333" actId="680"/>
+      <pc:chgData name="Matheus Nogueira" userId="3ffbdc37af4c2ab0" providerId="LiveId" clId="{4C4D23FA-B87B-4348-80D3-932FF489E74F}" dt="2021-05-08T00:38:42.167" v="357"/>
       <pc:docMkLst>
         <pc:docMk/>
       </pc:docMkLst>
@@ -381,12 +382,75 @@
           </ac:picMkLst>
         </pc:picChg>
       </pc:sldChg>
-      <pc:sldChg chg="new">
-        <pc:chgData name="Matheus Nogueira" userId="3ffbdc37af4c2ab0" providerId="LiveId" clId="{4C4D23FA-B87B-4348-80D3-932FF489E74F}" dt="2021-05-08T00:10:20.612" v="333" actId="680"/>
+      <pc:sldChg chg="addSp modSp new mod addCm modCm">
+        <pc:chgData name="Matheus Nogueira" userId="3ffbdc37af4c2ab0" providerId="LiveId" clId="{4C4D23FA-B87B-4348-80D3-932FF489E74F}" dt="2021-05-08T00:35:39.928" v="350" actId="20577"/>
         <pc:sldMkLst>
           <pc:docMk/>
           <pc:sldMk cId="1616153697" sldId="262"/>
         </pc:sldMkLst>
+        <pc:spChg chg="add mod">
+          <ac:chgData name="Matheus Nogueira" userId="3ffbdc37af4c2ab0" providerId="LiveId" clId="{4C4D23FA-B87B-4348-80D3-932FF489E74F}" dt="2021-05-08T00:23:32.865" v="336" actId="20577"/>
+          <ac:spMkLst>
+            <pc:docMk/>
+            <pc:sldMk cId="1616153697" sldId="262"/>
+            <ac:spMk id="2" creationId="{57FEF55B-250F-4367-8FD9-81D15AC722B4}"/>
+          </ac:spMkLst>
+        </pc:spChg>
+        <pc:spChg chg="add mod">
+          <ac:chgData name="Matheus Nogueira" userId="3ffbdc37af4c2ab0" providerId="LiveId" clId="{4C4D23FA-B87B-4348-80D3-932FF489E74F}" dt="2021-05-08T00:33:05.602" v="343" actId="1076"/>
+          <ac:spMkLst>
+            <pc:docMk/>
+            <pc:sldMk cId="1616153697" sldId="262"/>
+            <ac:spMk id="5" creationId="{FFB02164-D70F-45F5-B24D-931F9699D4AA}"/>
+          </ac:spMkLst>
+        </pc:spChg>
+        <pc:spChg chg="add mod">
+          <ac:chgData name="Matheus Nogueira" userId="3ffbdc37af4c2ab0" providerId="LiveId" clId="{4C4D23FA-B87B-4348-80D3-932FF489E74F}" dt="2021-05-08T00:35:39.928" v="350" actId="20577"/>
+          <ac:spMkLst>
+            <pc:docMk/>
+            <pc:sldMk cId="1616153697" sldId="262"/>
+            <ac:spMk id="8" creationId="{5F07ADE5-E8BF-43BD-B04F-B8D8BF5E59E7}"/>
+          </ac:spMkLst>
+        </pc:spChg>
+        <pc:picChg chg="add mod">
+          <ac:chgData name="Matheus Nogueira" userId="3ffbdc37af4c2ab0" providerId="LiveId" clId="{4C4D23FA-B87B-4348-80D3-932FF489E74F}" dt="2021-05-08T00:32:35.114" v="339" actId="1076"/>
+          <ac:picMkLst>
+            <pc:docMk/>
+            <pc:sldMk cId="1616153697" sldId="262"/>
+            <ac:picMk id="4" creationId="{85C1CC1A-A87A-4558-93E9-09F88648ED18}"/>
+          </ac:picMkLst>
+        </pc:picChg>
+        <pc:picChg chg="add mod">
+          <ac:chgData name="Matheus Nogueira" userId="3ffbdc37af4c2ab0" providerId="LiveId" clId="{4C4D23FA-B87B-4348-80D3-932FF489E74F}" dt="2021-05-08T00:35:34.158" v="346" actId="1076"/>
+          <ac:picMkLst>
+            <pc:docMk/>
+            <pc:sldMk cId="1616153697" sldId="262"/>
+            <ac:picMk id="7" creationId="{78AF52CA-DA76-4039-96EE-626075130007}"/>
+          </ac:picMkLst>
+        </pc:picChg>
+      </pc:sldChg>
+      <pc:sldChg chg="addSp modSp new mod addCm modCm">
+        <pc:chgData name="Matheus Nogueira" userId="3ffbdc37af4c2ab0" providerId="LiveId" clId="{4C4D23FA-B87B-4348-80D3-932FF489E74F}" dt="2021-05-08T00:38:42.167" v="357"/>
+        <pc:sldMkLst>
+          <pc:docMk/>
+          <pc:sldMk cId="351229649" sldId="263"/>
+        </pc:sldMkLst>
+        <pc:spChg chg="add mod">
+          <ac:chgData name="Matheus Nogueira" userId="3ffbdc37af4c2ab0" providerId="LiveId" clId="{4C4D23FA-B87B-4348-80D3-932FF489E74F}" dt="2021-05-08T00:38:02.489" v="355" actId="20577"/>
+          <ac:spMkLst>
+            <pc:docMk/>
+            <pc:sldMk cId="351229649" sldId="263"/>
+            <ac:spMk id="4" creationId="{2B7F9CAB-41AA-4C77-B7E6-7035D78C5B1A}"/>
+          </ac:spMkLst>
+        </pc:spChg>
+        <pc:picChg chg="add">
+          <ac:chgData name="Matheus Nogueira" userId="3ffbdc37af4c2ab0" providerId="LiveId" clId="{4C4D23FA-B87B-4348-80D3-932FF489E74F}" dt="2021-05-08T00:37:55.292" v="352" actId="22"/>
+          <ac:picMkLst>
+            <pc:docMk/>
+            <pc:sldMk cId="351229649" sldId="263"/>
+            <ac:picMk id="3" creationId="{DCE7FB5F-51C1-4BE3-B67D-102FEC2A2269}"/>
+          </ac:picMkLst>
+        </pc:picChg>
       </pc:sldChg>
     </pc:docChg>
   </pc:docChgLst>
@@ -535,6 +599,34 @@
   <p:cm authorId="1" dt="2021-05-07T21:10:07.201" idx="12">
     <p:pos x="3840" y="730"/>
     <p:text>Parece que valeu a pena no caso sem elitismo</p:text>
+    <p:extLst>
+      <p:ext uri="{C676402C-5697-4E1C-873F-D02D1690AC5C}">
+        <p15:threadingInfo xmlns:p15="http://schemas.microsoft.com/office/powerpoint/2012/main" timeZoneBias="180"/>
+      </p:ext>
+    </p:extLst>
+  </p:cm>
+</p:cmLst>
+</file>
+
+<file path=ppt/comments/comment7.xml><?xml version="1.0" encoding="utf-8"?>
+<p:cmLst xmlns:a="http://schemas.openxmlformats.org/drawingml/2006/main" xmlns:r="http://schemas.openxmlformats.org/officeDocument/2006/relationships" xmlns:p="http://schemas.openxmlformats.org/presentationml/2006/main">
+  <p:cm authorId="1" dt="2021-05-07T21:32:36.565" idx="13">
+    <p:pos x="3840" y="570"/>
+    <p:text>na ordem da legenda: one point, two points, uniform</p:text>
+    <p:extLst>
+      <p:ext uri="{C676402C-5697-4E1C-873F-D02D1690AC5C}">
+        <p15:threadingInfo xmlns:p15="http://schemas.microsoft.com/office/powerpoint/2012/main" timeZoneBias="180"/>
+      </p:ext>
+    </p:extLst>
+  </p:cm>
+</p:cmLst>
+</file>
+
+<file path=ppt/comments/comment8.xml><?xml version="1.0" encoding="utf-8"?>
+<p:cmLst xmlns:a="http://schemas.openxmlformats.org/drawingml/2006/main" xmlns:r="http://schemas.openxmlformats.org/officeDocument/2006/relationships" xmlns:p="http://schemas.openxmlformats.org/presentationml/2006/main">
+  <p:cm authorId="1" dt="2021-05-07T21:38:05.769" idx="14">
+    <p:pos x="5976" y="144"/>
+    <p:text>Ordem dos máximos: 10,50,100,200,300 na ordem da legenda</p:text>
     <p:extLst>
       <p:ext uri="{C676402C-5697-4E1C-873F-D02D1690AC5C}">
         <p15:threadingInfo xmlns:p15="http://schemas.microsoft.com/office/powerpoint/2012/main" timeZoneBias="180"/>
@@ -4534,10 +4626,270 @@
           <a:chExt cx="0" cy="0"/>
         </a:xfrm>
       </p:grpSpPr>
+      <p:sp>
+        <p:nvSpPr>
+          <p:cNvPr id="2" name="TextBox 1">
+            <a:extLst>
+              <a:ext uri="{FF2B5EF4-FFF2-40B4-BE49-F238E27FC236}">
+                <a16:creationId xmlns:a16="http://schemas.microsoft.com/office/drawing/2014/main" id="{57FEF55B-250F-4367-8FD9-81D15AC722B4}"/>
+              </a:ext>
+            </a:extLst>
+          </p:cNvPr>
+          <p:cNvSpPr txBox="1"/>
+          <p:nvPr/>
+        </p:nvSpPr>
+        <p:spPr>
+          <a:xfrm>
+            <a:off x="434109" y="184727"/>
+            <a:ext cx="1141082" cy="369332"/>
+          </a:xfrm>
+          <a:prstGeom prst="rect">
+            <a:avLst/>
+          </a:prstGeom>
+          <a:noFill/>
+        </p:spPr>
+        <p:txBody>
+          <a:bodyPr wrap="none" rtlCol="0">
+            <a:spAutoFit/>
+          </a:bodyPr>
+          <a:lstStyle/>
+          <a:p>
+            <a:r>
+              <a:rPr lang="pt-BR" dirty="0"/>
+              <a:t>Questão 6</a:t>
+            </a:r>
+          </a:p>
+        </p:txBody>
+      </p:sp>
+      <p:pic>
+        <p:nvPicPr>
+          <p:cNvPr id="4" name="Picture 3">
+            <a:extLst>
+              <a:ext uri="{FF2B5EF4-FFF2-40B4-BE49-F238E27FC236}">
+                <a16:creationId xmlns:a16="http://schemas.microsoft.com/office/drawing/2014/main" id="{85C1CC1A-A87A-4558-93E9-09F88648ED18}"/>
+              </a:ext>
+            </a:extLst>
+          </p:cNvPr>
+          <p:cNvPicPr>
+            <a:picLocks noChangeAspect="1"/>
+          </p:cNvPicPr>
+          <p:nvPr/>
+        </p:nvPicPr>
+        <p:blipFill>
+          <a:blip r:embed="rId2"/>
+          <a:stretch>
+            <a:fillRect/>
+          </a:stretch>
+        </p:blipFill>
+        <p:spPr>
+          <a:xfrm>
+            <a:off x="159318" y="905070"/>
+            <a:ext cx="5936682" cy="5537577"/>
+          </a:xfrm>
+          <a:prstGeom prst="rect">
+            <a:avLst/>
+          </a:prstGeom>
+        </p:spPr>
+      </p:pic>
+      <p:sp>
+        <p:nvSpPr>
+          <p:cNvPr id="5" name="TextBox 4">
+            <a:extLst>
+              <a:ext uri="{FF2B5EF4-FFF2-40B4-BE49-F238E27FC236}">
+                <a16:creationId xmlns:a16="http://schemas.microsoft.com/office/drawing/2014/main" id="{FFB02164-D70F-45F5-B24D-931F9699D4AA}"/>
+              </a:ext>
+            </a:extLst>
+          </p:cNvPr>
+          <p:cNvSpPr txBox="1"/>
+          <p:nvPr/>
+        </p:nvSpPr>
+        <p:spPr>
+          <a:xfrm>
+            <a:off x="683491" y="554059"/>
+            <a:ext cx="821059" cy="369332"/>
+          </a:xfrm>
+          <a:prstGeom prst="rect">
+            <a:avLst/>
+          </a:prstGeom>
+          <a:noFill/>
+        </p:spPr>
+        <p:txBody>
+          <a:bodyPr wrap="none" rtlCol="0">
+            <a:spAutoFit/>
+          </a:bodyPr>
+          <a:lstStyle/>
+          <a:p>
+            <a:r>
+              <a:rPr lang="pt-BR" dirty="0"/>
+              <a:t>GA 2-1</a:t>
+            </a:r>
+          </a:p>
+        </p:txBody>
+      </p:sp>
+      <p:pic>
+        <p:nvPicPr>
+          <p:cNvPr id="7" name="Picture 6">
+            <a:extLst>
+              <a:ext uri="{FF2B5EF4-FFF2-40B4-BE49-F238E27FC236}">
+                <a16:creationId xmlns:a16="http://schemas.microsoft.com/office/drawing/2014/main" id="{78AF52CA-DA76-4039-96EE-626075130007}"/>
+              </a:ext>
+            </a:extLst>
+          </p:cNvPr>
+          <p:cNvPicPr>
+            <a:picLocks noChangeAspect="1"/>
+          </p:cNvPicPr>
+          <p:nvPr/>
+        </p:nvPicPr>
+        <p:blipFill>
+          <a:blip r:embed="rId3"/>
+          <a:stretch>
+            <a:fillRect/>
+          </a:stretch>
+        </p:blipFill>
+        <p:spPr>
+          <a:xfrm>
+            <a:off x="6345382" y="923391"/>
+            <a:ext cx="5902328" cy="5537577"/>
+          </a:xfrm>
+          <a:prstGeom prst="rect">
+            <a:avLst/>
+          </a:prstGeom>
+        </p:spPr>
+      </p:pic>
+      <p:sp>
+        <p:nvSpPr>
+          <p:cNvPr id="8" name="TextBox 7">
+            <a:extLst>
+              <a:ext uri="{FF2B5EF4-FFF2-40B4-BE49-F238E27FC236}">
+                <a16:creationId xmlns:a16="http://schemas.microsoft.com/office/drawing/2014/main" id="{5F07ADE5-E8BF-43BD-B04F-B8D8BF5E59E7}"/>
+              </a:ext>
+            </a:extLst>
+          </p:cNvPr>
+          <p:cNvSpPr txBox="1"/>
+          <p:nvPr/>
+        </p:nvSpPr>
+        <p:spPr>
+          <a:xfrm>
+            <a:off x="9694141" y="588663"/>
+            <a:ext cx="821059" cy="369332"/>
+          </a:xfrm>
+          <a:prstGeom prst="rect">
+            <a:avLst/>
+          </a:prstGeom>
+          <a:noFill/>
+        </p:spPr>
+        <p:txBody>
+          <a:bodyPr wrap="none" rtlCol="0">
+            <a:spAutoFit/>
+          </a:bodyPr>
+          <a:lstStyle/>
+          <a:p>
+            <a:r>
+              <a:rPr lang="pt-BR" dirty="0"/>
+              <a:t>GA 2-2</a:t>
+            </a:r>
+          </a:p>
+        </p:txBody>
+      </p:sp>
     </p:spTree>
     <p:extLst>
       <p:ext uri="{BB962C8B-B14F-4D97-AF65-F5344CB8AC3E}">
         <p14:creationId xmlns:p14="http://schemas.microsoft.com/office/powerpoint/2010/main" val="1616153697"/>
+      </p:ext>
+    </p:extLst>
+  </p:cSld>
+  <p:clrMapOvr>
+    <a:masterClrMapping/>
+  </p:clrMapOvr>
+</p:sld>
+</file>
+
+<file path=ppt/slides/slide8.xml><?xml version="1.0" encoding="utf-8"?>
+<p:sld xmlns:a="http://schemas.openxmlformats.org/drawingml/2006/main" xmlns:r="http://schemas.openxmlformats.org/officeDocument/2006/relationships" xmlns:p="http://schemas.openxmlformats.org/presentationml/2006/main">
+  <p:cSld>
+    <p:spTree>
+      <p:nvGrpSpPr>
+        <p:cNvPr id="1" name=""/>
+        <p:cNvGrpSpPr/>
+        <p:nvPr/>
+      </p:nvGrpSpPr>
+      <p:grpSpPr>
+        <a:xfrm>
+          <a:off x="0" y="0"/>
+          <a:ext cx="0" cy="0"/>
+          <a:chOff x="0" y="0"/>
+          <a:chExt cx="0" cy="0"/>
+        </a:xfrm>
+      </p:grpSpPr>
+      <p:pic>
+        <p:nvPicPr>
+          <p:cNvPr id="3" name="Picture 2">
+            <a:extLst>
+              <a:ext uri="{FF2B5EF4-FFF2-40B4-BE49-F238E27FC236}">
+                <a16:creationId xmlns:a16="http://schemas.microsoft.com/office/drawing/2014/main" id="{DCE7FB5F-51C1-4BE3-B67D-102FEC2A2269}"/>
+              </a:ext>
+            </a:extLst>
+          </p:cNvPr>
+          <p:cNvPicPr>
+            <a:picLocks noChangeAspect="1"/>
+          </p:cNvPicPr>
+          <p:nvPr/>
+        </p:nvPicPr>
+        <p:blipFill>
+          <a:blip r:embed="rId2"/>
+          <a:stretch>
+            <a:fillRect/>
+          </a:stretch>
+        </p:blipFill>
+        <p:spPr>
+          <a:xfrm>
+            <a:off x="2704626" y="228153"/>
+            <a:ext cx="6782747" cy="6401693"/>
+          </a:xfrm>
+          <a:prstGeom prst="rect">
+            <a:avLst/>
+          </a:prstGeom>
+        </p:spPr>
+      </p:pic>
+      <p:sp>
+        <p:nvSpPr>
+          <p:cNvPr id="4" name="TextBox 3">
+            <a:extLst>
+              <a:ext uri="{FF2B5EF4-FFF2-40B4-BE49-F238E27FC236}">
+                <a16:creationId xmlns:a16="http://schemas.microsoft.com/office/drawing/2014/main" id="{2B7F9CAB-41AA-4C77-B7E6-7035D78C5B1A}"/>
+              </a:ext>
+            </a:extLst>
+          </p:cNvPr>
+          <p:cNvSpPr txBox="1"/>
+          <p:nvPr/>
+        </p:nvSpPr>
+        <p:spPr>
+          <a:xfrm>
+            <a:off x="434109" y="184727"/>
+            <a:ext cx="1141082" cy="369332"/>
+          </a:xfrm>
+          <a:prstGeom prst="rect">
+            <a:avLst/>
+          </a:prstGeom>
+          <a:noFill/>
+        </p:spPr>
+        <p:txBody>
+          <a:bodyPr wrap="none" rtlCol="0">
+            <a:spAutoFit/>
+          </a:bodyPr>
+          <a:lstStyle/>
+          <a:p>
+            <a:r>
+              <a:rPr lang="pt-BR" dirty="0"/>
+              <a:t>Questão 7</a:t>
+            </a:r>
+          </a:p>
+        </p:txBody>
+      </p:sp>
+    </p:spTree>
+    <p:extLst>
+      <p:ext uri="{BB962C8B-B14F-4D97-AF65-F5344CB8AC3E}">
+        <p14:creationId xmlns:p14="http://schemas.microsoft.com/office/powerpoint/2010/main" val="351229649"/>
       </p:ext>
     </p:extLst>
   </p:cSld>

</xml_diff>